<commit_message>
Cleaned up @print CSS to fit reports on one page
</commit_message>
<xml_diff>
--- a/cabrillo-summary.pptx
+++ b/cabrillo-summary.pptx
@@ -17,6 +17,7 @@
     <p:sldId id="266" r:id="rId11"/>
     <p:sldId id="263" r:id="rId12"/>
     <p:sldId id="265" r:id="rId13"/>
+    <p:sldId id="268" r:id="rId14"/>
   </p:sldIdLst>
   <p:sldSz cx="12192000" cy="6858000"/>
   <p:notesSz cx="6858000" cy="9144000"/>
@@ -115,6 +116,11 @@
       </a:defRPr>
     </a:lvl9pPr>
   </p:defaultTextStyle>
+  <p:extLst>
+    <p:ext uri="{EFAFB233-063F-42B5-8137-9DF3F51BA10A}">
+      <p15:sldGuideLst xmlns:p15="http://schemas.microsoft.com/office/powerpoint/2012/main"/>
+    </p:ext>
+  </p:extLst>
 </p:presentation>
 </file>
 
@@ -6427,7 +6433,19 @@
             </a:pPr>
             <a:r>
               <a:rPr lang="en-US" sz="2800" dirty="0"/>
-              <a:t>FT ranking likely decreases, lower into the </a:t>
+              <a:t>FT ranking </a:t>
+            </a:r>
+            <a:r>
+              <a:rPr lang="en-US" sz="2800" b="1" dirty="0">
+                <a:solidFill>
+                  <a:srgbClr val="FFFF00"/>
+                </a:solidFill>
+              </a:rPr>
+              <a:t>likely decreases</a:t>
+            </a:r>
+            <a:r>
+              <a:rPr lang="en-US" sz="2800" dirty="0"/>
+              <a:t>, lower into the </a:t>
             </a:r>
             <a:r>
               <a:rPr lang="en-US" sz="2800" b="1" dirty="0">
@@ -6742,6 +6760,229 @@
       <p:bldP spid="5" grpId="0" build="p" animBg="1"/>
     </p:bldLst>
   </p:timing>
+</p:sld>
+</file>
+
+<file path=ppt/slides/slide13.xml><?xml version="1.0" encoding="utf-8"?>
+<p:sld xmlns:a="http://schemas.openxmlformats.org/drawingml/2006/main" xmlns:r="http://schemas.openxmlformats.org/officeDocument/2006/relationships" xmlns:p="http://schemas.openxmlformats.org/presentationml/2006/main">
+  <p:cSld>
+    <p:spTree>
+      <p:nvGrpSpPr>
+        <p:cNvPr id="1" name=""/>
+        <p:cNvGrpSpPr/>
+        <p:nvPr/>
+      </p:nvGrpSpPr>
+      <p:grpSpPr>
+        <a:xfrm>
+          <a:off x="0" y="0"/>
+          <a:ext cx="0" cy="0"/>
+          <a:chOff x="0" y="0"/>
+          <a:chExt cx="0" cy="0"/>
+        </a:xfrm>
+      </p:grpSpPr>
+      <p:sp>
+        <p:nvSpPr>
+          <p:cNvPr id="3" name="Title 2">
+            <a:extLst>
+              <a:ext uri="{FF2B5EF4-FFF2-40B4-BE49-F238E27FC236}">
+                <a16:creationId xmlns:a16="http://schemas.microsoft.com/office/drawing/2014/main" id="{2E3C86B9-2F3F-6B4C-B2BA-0A7955988448}"/>
+              </a:ext>
+            </a:extLst>
+          </p:cNvPr>
+          <p:cNvSpPr>
+            <a:spLocks noGrp="1"/>
+          </p:cNvSpPr>
+          <p:nvPr>
+            <p:ph type="title"/>
+          </p:nvPr>
+        </p:nvSpPr>
+        <p:spPr/>
+        <p:txBody>
+          <a:bodyPr/>
+          <a:lstStyle/>
+          <a:p>
+            <a:r>
+              <a:rPr lang="en-US" dirty="0"/>
+              <a:t>From Jo-Ann </a:t>
+            </a:r>
+            <a:r>
+              <a:rPr lang="en-US" dirty="0" err="1"/>
+              <a:t>Panzardi</a:t>
+            </a:r>
+            <a:r>
+              <a:rPr lang="en-US" dirty="0"/>
+              <a:t>, Engineering Chair</a:t>
+            </a:r>
+          </a:p>
+        </p:txBody>
+      </p:sp>
+      <p:sp>
+        <p:nvSpPr>
+          <p:cNvPr id="4" name="Content Placeholder 3">
+            <a:extLst>
+              <a:ext uri="{FF2B5EF4-FFF2-40B4-BE49-F238E27FC236}">
+                <a16:creationId xmlns:a16="http://schemas.microsoft.com/office/drawing/2014/main" id="{04691468-7825-8841-95C5-BCA1F805D7A4}"/>
+              </a:ext>
+            </a:extLst>
+          </p:cNvPr>
+          <p:cNvSpPr>
+            <a:spLocks noGrp="1"/>
+          </p:cNvSpPr>
+          <p:nvPr>
+            <p:ph sz="half" idx="1"/>
+          </p:nvPr>
+        </p:nvSpPr>
+        <p:spPr>
+          <a:xfrm>
+            <a:off x="203200" y="1485900"/>
+            <a:ext cx="5816600" cy="5270500"/>
+          </a:xfrm>
+        </p:spPr>
+        <p:style>
+          <a:lnRef idx="0">
+            <a:schemeClr val="accent4"/>
+          </a:lnRef>
+          <a:fillRef idx="3">
+            <a:schemeClr val="accent4"/>
+          </a:fillRef>
+          <a:effectRef idx="3">
+            <a:schemeClr val="accent4"/>
+          </a:effectRef>
+          <a:fontRef idx="minor">
+            <a:schemeClr val="lt1"/>
+          </a:fontRef>
+        </p:style>
+        <p:txBody>
+          <a:bodyPr>
+            <a:normAutofit fontScale="85000" lnSpcReduction="20000"/>
+          </a:bodyPr>
+          <a:lstStyle/>
+          <a:p>
+            <a:pPr marL="0" indent="0">
+              <a:buNone/>
+            </a:pPr>
+            <a:r>
+              <a:rPr lang="en-US" dirty="0"/>
+              <a:t>I am speaking on behalf for the newer hired full-time faculty, (not for me as a long time faculty).....</a:t>
+            </a:r>
+          </a:p>
+          <a:p>
+            <a:pPr marL="0" indent="0">
+              <a:buNone/>
+            </a:pPr>
+            <a:endParaRPr lang="en-US" dirty="0"/>
+          </a:p>
+          <a:p>
+            <a:pPr marL="0" indent="0">
+              <a:buNone/>
+            </a:pPr>
+            <a:r>
+              <a:rPr lang="en-US" dirty="0"/>
+              <a:t>The f-t salary is causing newer full-time faculty to leave ... Damian and Joe in Math; Beth in Anthro</a:t>
+            </a:r>
+          </a:p>
+          <a:p>
+            <a:pPr marL="0" indent="0">
+              <a:buNone/>
+            </a:pPr>
+            <a:endParaRPr lang="en-US" dirty="0"/>
+          </a:p>
+          <a:p>
+            <a:pPr marL="0" indent="0">
+              <a:buNone/>
+            </a:pPr>
+            <a:r>
+              <a:rPr lang="en-US" dirty="0"/>
+              <a:t>I fully support all the salary increase to go to newer full-time faculty.</a:t>
+            </a:r>
+          </a:p>
+          <a:p>
+            <a:pPr marL="0" indent="0">
+              <a:buNone/>
+            </a:pPr>
+            <a:endParaRPr lang="en-US" dirty="0"/>
+          </a:p>
+          <a:p>
+            <a:pPr marL="0" indent="0">
+              <a:buNone/>
+            </a:pPr>
+            <a:r>
+              <a:rPr lang="en-US" dirty="0"/>
+              <a:t>Or, if this is too non-conventional, I support the full amount going to full-time faculty in the hopes that this will </a:t>
+            </a:r>
+            <a:r>
+              <a:rPr lang="en-US" dirty="0" err="1"/>
+              <a:t>supoprt</a:t>
+            </a:r>
+            <a:r>
+              <a:rPr lang="en-US" dirty="0"/>
+              <a:t> [sic] us keeping newer faculty and enticing new faculty recruits.</a:t>
+            </a:r>
+          </a:p>
+        </p:txBody>
+      </p:sp>
+      <p:sp>
+        <p:nvSpPr>
+          <p:cNvPr id="6" name="Content Placeholder 5">
+            <a:extLst>
+              <a:ext uri="{FF2B5EF4-FFF2-40B4-BE49-F238E27FC236}">
+                <a16:creationId xmlns:a16="http://schemas.microsoft.com/office/drawing/2014/main" id="{4AE8F6A7-43E8-BE4A-B372-1B78B5AC8D1C}"/>
+              </a:ext>
+            </a:extLst>
+          </p:cNvPr>
+          <p:cNvSpPr>
+            <a:spLocks noGrp="1"/>
+          </p:cNvSpPr>
+          <p:nvPr>
+            <p:ph sz="half" idx="2"/>
+          </p:nvPr>
+        </p:nvSpPr>
+        <p:spPr>
+          <a:xfrm>
+            <a:off x="6172200" y="1825625"/>
+            <a:ext cx="5778500" cy="4351338"/>
+          </a:xfrm>
+        </p:spPr>
+        <p:style>
+          <a:lnRef idx="0">
+            <a:schemeClr val="accent1"/>
+          </a:lnRef>
+          <a:fillRef idx="3">
+            <a:schemeClr val="accent1"/>
+          </a:fillRef>
+          <a:effectRef idx="3">
+            <a:schemeClr val="accent1"/>
+          </a:effectRef>
+          <a:fontRef idx="minor">
+            <a:schemeClr val="lt1"/>
+          </a:fontRef>
+        </p:style>
+        <p:txBody>
+          <a:bodyPr anchor="ctr">
+            <a:normAutofit fontScale="85000" lnSpcReduction="20000"/>
+          </a:bodyPr>
+          <a:lstStyle/>
+          <a:p>
+            <a:pPr marL="0" indent="0">
+              <a:buNone/>
+            </a:pPr>
+            <a:r>
+              <a:rPr lang="en-US" sz="3600" dirty="0"/>
+              <a:t>You can voice my concern that we need to attract new faculty and keep new faculty, so my support is to pay any full-time faculty hired in the last ten years more.</a:t>
+            </a:r>
+          </a:p>
+        </p:txBody>
+      </p:sp>
+    </p:spTree>
+    <p:extLst>
+      <p:ext uri="{BB962C8B-B14F-4D97-AF65-F5344CB8AC3E}">
+        <p14:creationId xmlns:p14="http://schemas.microsoft.com/office/powerpoint/2010/main" val="2265082209"/>
+      </p:ext>
+    </p:extLst>
+  </p:cSld>
+  <p:clrMapOvr>
+    <a:masterClrMapping/>
+  </p:clrMapOvr>
 </p:sld>
 </file>
 
@@ -10375,7 +10616,7 @@
             </a:r>
             <a:r>
               <a:rPr lang="en-US" sz="2400" dirty="0"/>
-              <a:t> part-time rates include office-hour pay. Some districts pay for 1-2 hours at a </a:t>
+              <a:t> part-time rates include office-hour pay. Some districts instead pay extra for 1-2 hours at a </a:t>
             </a:r>
             <a:r>
               <a:rPr lang="en-US" sz="2400" b="1" dirty="0">
@@ -10508,8 +10749,8 @@
           </a:p>
         </p:txBody>
       </p:sp>
-      <mc:AlternateContent xmlns:mc="http://schemas.openxmlformats.org/markup-compatibility/2006">
-        <mc:Choice xmlns:a14="http://schemas.microsoft.com/office/drawing/2010/main" Requires="a14">
+      <mc:AlternateContent xmlns:mc="http://schemas.openxmlformats.org/markup-compatibility/2006" xmlns:a14="http://schemas.microsoft.com/office/drawing/2010/main">
+        <mc:Choice Requires="a14">
           <p:sp>
             <p:nvSpPr>
               <p:cNvPr id="9" name="Rectangle 8">
@@ -10709,7 +10950,7 @@
             </p:txBody>
           </p:sp>
         </mc:Choice>
-        <mc:Fallback>
+        <mc:Fallback xmlns="">
           <p:sp>
             <p:nvSpPr>
               <p:cNvPr id="9" name="Rectangle 8">

</xml_diff>

<commit_message>
Made prettier with percentile gauges
</commit_message>
<xml_diff>
--- a/cabrillo-summary.pptx
+++ b/cabrillo-summary.pptx
@@ -6164,6 +6164,96 @@
           </a:p>
         </p:txBody>
       </p:sp>
+      <p:pic>
+        <p:nvPicPr>
+          <p:cNvPr id="6" name="Picture 5">
+            <a:extLst>
+              <a:ext uri="{FF2B5EF4-FFF2-40B4-BE49-F238E27FC236}">
+                <a16:creationId xmlns:a16="http://schemas.microsoft.com/office/drawing/2014/main" id="{9AC19737-B3F1-BF40-83AE-15277C85C773}"/>
+              </a:ext>
+            </a:extLst>
+          </p:cNvPr>
+          <p:cNvPicPr>
+            <a:picLocks noChangeAspect="1"/>
+          </p:cNvPicPr>
+          <p:nvPr/>
+        </p:nvPicPr>
+        <p:blipFill>
+          <a:blip r:embed="rId2"/>
+          <a:stretch>
+            <a:fillRect/>
+          </a:stretch>
+        </p:blipFill>
+        <p:spPr>
+          <a:xfrm>
+            <a:off x="3046280" y="1720717"/>
+            <a:ext cx="1206500" cy="4127500"/>
+          </a:xfrm>
+          <a:prstGeom prst="rect">
+            <a:avLst/>
+          </a:prstGeom>
+        </p:spPr>
+      </p:pic>
+      <p:pic>
+        <p:nvPicPr>
+          <p:cNvPr id="7" name="Picture 6">
+            <a:extLst>
+              <a:ext uri="{FF2B5EF4-FFF2-40B4-BE49-F238E27FC236}">
+                <a16:creationId xmlns:a16="http://schemas.microsoft.com/office/drawing/2014/main" id="{D3CF7D0E-A285-D64E-952C-18B934C39132}"/>
+              </a:ext>
+            </a:extLst>
+          </p:cNvPr>
+          <p:cNvPicPr>
+            <a:picLocks noChangeAspect="1"/>
+          </p:cNvPicPr>
+          <p:nvPr/>
+        </p:nvPicPr>
+        <p:blipFill>
+          <a:blip r:embed="rId3"/>
+          <a:stretch>
+            <a:fillRect/>
+          </a:stretch>
+        </p:blipFill>
+        <p:spPr>
+          <a:xfrm>
+            <a:off x="6640379" y="1660265"/>
+            <a:ext cx="1320800" cy="4114800"/>
+          </a:xfrm>
+          <a:prstGeom prst="rect">
+            <a:avLst/>
+          </a:prstGeom>
+        </p:spPr>
+      </p:pic>
+      <p:pic>
+        <p:nvPicPr>
+          <p:cNvPr id="8" name="Picture 7">
+            <a:extLst>
+              <a:ext uri="{FF2B5EF4-FFF2-40B4-BE49-F238E27FC236}">
+                <a16:creationId xmlns:a16="http://schemas.microsoft.com/office/drawing/2014/main" id="{F90C6DA4-C942-B84E-99AA-828464B936D8}"/>
+              </a:ext>
+            </a:extLst>
+          </p:cNvPr>
+          <p:cNvPicPr>
+            <a:picLocks noChangeAspect="1"/>
+          </p:cNvPicPr>
+          <p:nvPr/>
+        </p:nvPicPr>
+        <p:blipFill>
+          <a:blip r:embed="rId4"/>
+          <a:stretch>
+            <a:fillRect/>
+          </a:stretch>
+        </p:blipFill>
+        <p:spPr>
+          <a:xfrm>
+            <a:off x="10412278" y="1715129"/>
+            <a:ext cx="1257300" cy="4114800"/>
+          </a:xfrm>
+          <a:prstGeom prst="rect">
+            <a:avLst/>
+          </a:prstGeom>
+        </p:spPr>
+      </p:pic>
     </p:spTree>
     <p:extLst>
       <p:ext uri="{BB962C8B-B14F-4D97-AF65-F5344CB8AC3E}">
@@ -6221,39 +6311,21 @@
                                   </p:childTnLst>
                                 </p:cTn>
                               </p:par>
-                            </p:childTnLst>
-                          </p:cTn>
-                        </p:par>
-                      </p:childTnLst>
-                    </p:cTn>
-                  </p:par>
-                  <p:par>
-                    <p:cTn id="7" fill="hold">
-                      <p:stCondLst>
-                        <p:cond delay="indefinite"/>
-                      </p:stCondLst>
-                      <p:childTnLst>
-                        <p:par>
-                          <p:cTn id="8" fill="hold">
-                            <p:stCondLst>
-                              <p:cond delay="0"/>
-                            </p:stCondLst>
-                            <p:childTnLst>
                               <p:par>
-                                <p:cTn id="9" presetID="1" presetClass="entr" presetSubtype="0" fill="hold" grpId="0" nodeType="clickEffect">
+                                <p:cTn id="7" presetID="1" presetClass="entr" presetSubtype="0" fill="hold" nodeType="withEffect">
                                   <p:stCondLst>
                                     <p:cond delay="0"/>
                                   </p:stCondLst>
                                   <p:childTnLst>
                                     <p:set>
                                       <p:cBhvr>
-                                        <p:cTn id="10" dur="1" fill="hold">
+                                        <p:cTn id="8" dur="1" fill="hold">
                                           <p:stCondLst>
                                             <p:cond delay="0"/>
                                           </p:stCondLst>
                                         </p:cTn>
                                         <p:tgtEl>
-                                          <p:spTgt spid="12"/>
+                                          <p:spTgt spid="6"/>
                                         </p:tgtEl>
                                         <p:attrNameLst>
                                           <p:attrName>style.visibility</p:attrName>
@@ -6273,19 +6345,46 @@
                     </p:cTn>
                   </p:par>
                   <p:par>
-                    <p:cTn id="11" fill="hold">
+                    <p:cTn id="9" fill="hold">
                       <p:stCondLst>
                         <p:cond delay="indefinite"/>
                       </p:stCondLst>
                       <p:childTnLst>
                         <p:par>
-                          <p:cTn id="12" fill="hold">
+                          <p:cTn id="10" fill="hold">
                             <p:stCondLst>
                               <p:cond delay="0"/>
                             </p:stCondLst>
                             <p:childTnLst>
                               <p:par>
-                                <p:cTn id="13" presetID="1" presetClass="entr" presetSubtype="0" fill="hold" grpId="0" nodeType="clickEffect">
+                                <p:cTn id="11" presetID="1" presetClass="entr" presetSubtype="0" fill="hold" grpId="0" nodeType="clickEffect">
+                                  <p:stCondLst>
+                                    <p:cond delay="0"/>
+                                  </p:stCondLst>
+                                  <p:childTnLst>
+                                    <p:set>
+                                      <p:cBhvr>
+                                        <p:cTn id="12" dur="1" fill="hold">
+                                          <p:stCondLst>
+                                            <p:cond delay="0"/>
+                                          </p:stCondLst>
+                                        </p:cTn>
+                                        <p:tgtEl>
+                                          <p:spTgt spid="12"/>
+                                        </p:tgtEl>
+                                        <p:attrNameLst>
+                                          <p:attrName>style.visibility</p:attrName>
+                                        </p:attrNameLst>
+                                      </p:cBhvr>
+                                      <p:to>
+                                        <p:strVal val="visible"/>
+                                      </p:to>
+                                    </p:set>
+                                  </p:childTnLst>
+                                </p:cTn>
+                              </p:par>
+                              <p:par>
+                                <p:cTn id="13" presetID="1" presetClass="entr" presetSubtype="0" fill="hold" nodeType="withEffect">
                                   <p:stCondLst>
                                     <p:cond delay="0"/>
                                   </p:stCondLst>
@@ -6298,7 +6397,79 @@
                                           </p:stCondLst>
                                         </p:cTn>
                                         <p:tgtEl>
+                                          <p:spTgt spid="7"/>
+                                        </p:tgtEl>
+                                        <p:attrNameLst>
+                                          <p:attrName>style.visibility</p:attrName>
+                                        </p:attrNameLst>
+                                      </p:cBhvr>
+                                      <p:to>
+                                        <p:strVal val="visible"/>
+                                      </p:to>
+                                    </p:set>
+                                  </p:childTnLst>
+                                </p:cTn>
+                              </p:par>
+                            </p:childTnLst>
+                          </p:cTn>
+                        </p:par>
+                      </p:childTnLst>
+                    </p:cTn>
+                  </p:par>
+                  <p:par>
+                    <p:cTn id="15" fill="hold">
+                      <p:stCondLst>
+                        <p:cond delay="indefinite"/>
+                      </p:stCondLst>
+                      <p:childTnLst>
+                        <p:par>
+                          <p:cTn id="16" fill="hold">
+                            <p:stCondLst>
+                              <p:cond delay="0"/>
+                            </p:stCondLst>
+                            <p:childTnLst>
+                              <p:par>
+                                <p:cTn id="17" presetID="1" presetClass="entr" presetSubtype="0" fill="hold" grpId="0" nodeType="clickEffect">
+                                  <p:stCondLst>
+                                    <p:cond delay="0"/>
+                                  </p:stCondLst>
+                                  <p:childTnLst>
+                                    <p:set>
+                                      <p:cBhvr>
+                                        <p:cTn id="18" dur="1" fill="hold">
+                                          <p:stCondLst>
+                                            <p:cond delay="0"/>
+                                          </p:stCondLst>
+                                        </p:cTn>
+                                        <p:tgtEl>
                                           <p:spTgt spid="13"/>
+                                        </p:tgtEl>
+                                        <p:attrNameLst>
+                                          <p:attrName>style.visibility</p:attrName>
+                                        </p:attrNameLst>
+                                      </p:cBhvr>
+                                      <p:to>
+                                        <p:strVal val="visible"/>
+                                      </p:to>
+                                    </p:set>
+                                  </p:childTnLst>
+                                </p:cTn>
+                              </p:par>
+                              <p:par>
+                                <p:cTn id="19" presetID="1" presetClass="entr" presetSubtype="0" fill="hold" nodeType="withEffect">
+                                  <p:stCondLst>
+                                    <p:cond delay="0"/>
+                                  </p:stCondLst>
+                                  <p:childTnLst>
+                                    <p:set>
+                                      <p:cBhvr>
+                                        <p:cTn id="20" dur="1" fill="hold">
+                                          <p:stCondLst>
+                                            <p:cond delay="0"/>
+                                          </p:stCondLst>
+                                        </p:cTn>
+                                        <p:tgtEl>
+                                          <p:spTgt spid="8"/>
                                         </p:tgtEl>
                                         <p:attrNameLst>
                                           <p:attrName>style.visibility</p:attrName>
@@ -6676,6 +6847,96 @@
           </a:p>
         </p:txBody>
       </p:sp>
+      <p:pic>
+        <p:nvPicPr>
+          <p:cNvPr id="6" name="Picture 5">
+            <a:extLst>
+              <a:ext uri="{FF2B5EF4-FFF2-40B4-BE49-F238E27FC236}">
+                <a16:creationId xmlns:a16="http://schemas.microsoft.com/office/drawing/2014/main" id="{ED8D3EB6-05C5-A54C-B380-51432B04F8B5}"/>
+              </a:ext>
+            </a:extLst>
+          </p:cNvPr>
+          <p:cNvPicPr>
+            <a:picLocks noChangeAspect="1"/>
+          </p:cNvPicPr>
+          <p:nvPr/>
+        </p:nvPicPr>
+        <p:blipFill>
+          <a:blip r:embed="rId2"/>
+          <a:stretch>
+            <a:fillRect/>
+          </a:stretch>
+        </p:blipFill>
+        <p:spPr>
+          <a:xfrm>
+            <a:off x="3064538" y="-181235"/>
+            <a:ext cx="1206500" cy="4127500"/>
+          </a:xfrm>
+          <a:prstGeom prst="rect">
+            <a:avLst/>
+          </a:prstGeom>
+        </p:spPr>
+      </p:pic>
+      <p:pic>
+        <p:nvPicPr>
+          <p:cNvPr id="7" name="Picture 6">
+            <a:extLst>
+              <a:ext uri="{FF2B5EF4-FFF2-40B4-BE49-F238E27FC236}">
+                <a16:creationId xmlns:a16="http://schemas.microsoft.com/office/drawing/2014/main" id="{DA520E9E-8A15-4D42-ABB5-D5BD5702046C}"/>
+              </a:ext>
+            </a:extLst>
+          </p:cNvPr>
+          <p:cNvPicPr>
+            <a:picLocks noChangeAspect="1"/>
+          </p:cNvPicPr>
+          <p:nvPr/>
+        </p:nvPicPr>
+        <p:blipFill>
+          <a:blip r:embed="rId3"/>
+          <a:stretch>
+            <a:fillRect/>
+          </a:stretch>
+        </p:blipFill>
+        <p:spPr>
+          <a:xfrm>
+            <a:off x="6658637" y="-241687"/>
+            <a:ext cx="1320800" cy="4114800"/>
+          </a:xfrm>
+          <a:prstGeom prst="rect">
+            <a:avLst/>
+          </a:prstGeom>
+        </p:spPr>
+      </p:pic>
+      <p:pic>
+        <p:nvPicPr>
+          <p:cNvPr id="8" name="Picture 7">
+            <a:extLst>
+              <a:ext uri="{FF2B5EF4-FFF2-40B4-BE49-F238E27FC236}">
+                <a16:creationId xmlns:a16="http://schemas.microsoft.com/office/drawing/2014/main" id="{878AA4A0-B7A5-9849-AB70-E4B8E06605EF}"/>
+              </a:ext>
+            </a:extLst>
+          </p:cNvPr>
+          <p:cNvPicPr>
+            <a:picLocks noChangeAspect="1"/>
+          </p:cNvPicPr>
+          <p:nvPr/>
+        </p:nvPicPr>
+        <p:blipFill>
+          <a:blip r:embed="rId4"/>
+          <a:stretch>
+            <a:fillRect/>
+          </a:stretch>
+        </p:blipFill>
+        <p:spPr>
+          <a:xfrm>
+            <a:off x="10430536" y="-186823"/>
+            <a:ext cx="1257300" cy="4114800"/>
+          </a:xfrm>
+          <a:prstGeom prst="rect">
+            <a:avLst/>
+          </a:prstGeom>
+        </p:spPr>
+      </p:pic>
       <p:sp>
         <p:nvSpPr>
           <p:cNvPr id="5" name="Rectangle 4">
@@ -6864,6 +7125,149 @@
               <a:rPr lang="en-US" sz="2800" dirty="0"/>
               <a:t> WRT cost of living.</a:t>
             </a:r>
+          </a:p>
+        </p:txBody>
+      </p:sp>
+      <p:sp>
+        <p:nvSpPr>
+          <p:cNvPr id="2" name="Up Arrow 1">
+            <a:extLst>
+              <a:ext uri="{FF2B5EF4-FFF2-40B4-BE49-F238E27FC236}">
+                <a16:creationId xmlns:a16="http://schemas.microsoft.com/office/drawing/2014/main" id="{778B3853-C4C8-F341-BA7C-CB0E4B727355}"/>
+              </a:ext>
+            </a:extLst>
+          </p:cNvPr>
+          <p:cNvSpPr/>
+          <p:nvPr/>
+        </p:nvSpPr>
+        <p:spPr>
+          <a:xfrm>
+            <a:off x="7207274" y="-18288"/>
+            <a:ext cx="365760" cy="738421"/>
+          </a:xfrm>
+          <a:prstGeom prst="upArrow">
+            <a:avLst/>
+          </a:prstGeom>
+          <a:solidFill>
+            <a:srgbClr val="92D050"/>
+          </a:solidFill>
+        </p:spPr>
+        <p:style>
+          <a:lnRef idx="0">
+            <a:schemeClr val="accent2"/>
+          </a:lnRef>
+          <a:fillRef idx="3">
+            <a:schemeClr val="accent2"/>
+          </a:fillRef>
+          <a:effectRef idx="3">
+            <a:schemeClr val="accent2"/>
+          </a:effectRef>
+          <a:fontRef idx="minor">
+            <a:schemeClr val="lt1"/>
+          </a:fontRef>
+        </p:style>
+        <p:txBody>
+          <a:bodyPr rtlCol="0" anchor="ctr"/>
+          <a:lstStyle/>
+          <a:p>
+            <a:pPr algn="ctr"/>
+            <a:endParaRPr lang="en-US"/>
+          </a:p>
+        </p:txBody>
+      </p:sp>
+      <p:sp>
+        <p:nvSpPr>
+          <p:cNvPr id="10" name="Up Arrow 9">
+            <a:extLst>
+              <a:ext uri="{FF2B5EF4-FFF2-40B4-BE49-F238E27FC236}">
+                <a16:creationId xmlns:a16="http://schemas.microsoft.com/office/drawing/2014/main" id="{EE5E7B6D-E0FB-DF4D-9329-E6694D9E5151}"/>
+              </a:ext>
+            </a:extLst>
+          </p:cNvPr>
+          <p:cNvSpPr/>
+          <p:nvPr/>
+        </p:nvSpPr>
+        <p:spPr>
+          <a:xfrm>
+            <a:off x="10931170" y="-18288"/>
+            <a:ext cx="365760" cy="738421"/>
+          </a:xfrm>
+          <a:prstGeom prst="upArrow">
+            <a:avLst/>
+          </a:prstGeom>
+          <a:solidFill>
+            <a:srgbClr val="92D050"/>
+          </a:solidFill>
+        </p:spPr>
+        <p:style>
+          <a:lnRef idx="0">
+            <a:schemeClr val="accent2"/>
+          </a:lnRef>
+          <a:fillRef idx="3">
+            <a:schemeClr val="accent2"/>
+          </a:fillRef>
+          <a:effectRef idx="3">
+            <a:schemeClr val="accent2"/>
+          </a:effectRef>
+          <a:fontRef idx="minor">
+            <a:schemeClr val="lt1"/>
+          </a:fontRef>
+        </p:style>
+        <p:txBody>
+          <a:bodyPr rtlCol="0" anchor="ctr"/>
+          <a:lstStyle/>
+          <a:p>
+            <a:pPr algn="ctr"/>
+            <a:endParaRPr lang="en-US"/>
+          </a:p>
+        </p:txBody>
+      </p:sp>
+      <p:sp>
+        <p:nvSpPr>
+          <p:cNvPr id="14" name="Up Arrow 13">
+            <a:extLst>
+              <a:ext uri="{FF2B5EF4-FFF2-40B4-BE49-F238E27FC236}">
+                <a16:creationId xmlns:a16="http://schemas.microsoft.com/office/drawing/2014/main" id="{EAB8E5F1-BC20-FB40-B7CF-5BF4A9F2E685}"/>
+              </a:ext>
+            </a:extLst>
+          </p:cNvPr>
+          <p:cNvSpPr/>
+          <p:nvPr/>
+        </p:nvSpPr>
+        <p:spPr>
+          <a:xfrm rot="10800000">
+            <a:off x="3504742" y="2310384"/>
+            <a:ext cx="365760" cy="738421"/>
+          </a:xfrm>
+          <a:prstGeom prst="upArrow">
+            <a:avLst/>
+          </a:prstGeom>
+          <a:solidFill>
+            <a:srgbClr val="FF0000"/>
+          </a:solidFill>
+        </p:spPr>
+        <p:style>
+          <a:lnRef idx="2">
+            <a:schemeClr val="accent5">
+              <a:shade val="50000"/>
+            </a:schemeClr>
+          </a:lnRef>
+          <a:fillRef idx="1">
+            <a:schemeClr val="accent5"/>
+          </a:fillRef>
+          <a:effectRef idx="0">
+            <a:schemeClr val="accent5"/>
+          </a:effectRef>
+          <a:fontRef idx="minor">
+            <a:schemeClr val="lt1"/>
+          </a:fontRef>
+        </p:style>
+        <p:txBody>
+          <a:bodyPr rtlCol="0" anchor="ctr"/>
+          <a:lstStyle/>
+          <a:p>
+            <a:pPr algn="ctr"/>
+            <a:endParaRPr lang="en-US"/>
           </a:p>
         </p:txBody>
       </p:sp>
@@ -7024,6 +7428,112 @@
                                   </p:childTnLst>
                                 </p:cTn>
                               </p:par>
+                              <p:par>
+                                <p:cTn id="15" presetID="1" presetClass="entr" presetSubtype="0" fill="hold" grpId="1" nodeType="withEffect">
+                                  <p:stCondLst>
+                                    <p:cond delay="0"/>
+                                  </p:stCondLst>
+                                  <p:childTnLst>
+                                    <p:set>
+                                      <p:cBhvr>
+                                        <p:cTn id="16" dur="1" fill="hold">
+                                          <p:stCondLst>
+                                            <p:cond delay="0"/>
+                                          </p:stCondLst>
+                                        </p:cTn>
+                                        <p:tgtEl>
+                                          <p:spTgt spid="2"/>
+                                        </p:tgtEl>
+                                        <p:attrNameLst>
+                                          <p:attrName>style.visibility</p:attrName>
+                                        </p:attrNameLst>
+                                      </p:cBhvr>
+                                      <p:to>
+                                        <p:strVal val="visible"/>
+                                      </p:to>
+                                    </p:set>
+                                  </p:childTnLst>
+                                </p:cTn>
+                              </p:par>
+                              <p:par>
+                                <p:cTn id="17" presetID="1" presetClass="entr" presetSubtype="0" fill="hold" grpId="1" nodeType="withEffect">
+                                  <p:stCondLst>
+                                    <p:cond delay="0"/>
+                                  </p:stCondLst>
+                                  <p:childTnLst>
+                                    <p:set>
+                                      <p:cBhvr>
+                                        <p:cTn id="18" dur="1" fill="hold">
+                                          <p:stCondLst>
+                                            <p:cond delay="0"/>
+                                          </p:stCondLst>
+                                        </p:cTn>
+                                        <p:tgtEl>
+                                          <p:spTgt spid="10"/>
+                                        </p:tgtEl>
+                                        <p:attrNameLst>
+                                          <p:attrName>style.visibility</p:attrName>
+                                        </p:attrNameLst>
+                                      </p:cBhvr>
+                                      <p:to>
+                                        <p:strVal val="visible"/>
+                                      </p:to>
+                                    </p:set>
+                                  </p:childTnLst>
+                                </p:cTn>
+                              </p:par>
+                              <p:par>
+                                <p:cTn id="19" presetID="26" presetClass="emph" presetSubtype="0" repeatCount="indefinite" fill="hold" grpId="0" nodeType="withEffect">
+                                  <p:stCondLst>
+                                    <p:cond delay="0"/>
+                                  </p:stCondLst>
+                                  <p:childTnLst>
+                                    <p:animEffect transition="out" filter="fade">
+                                      <p:cBhvr>
+                                        <p:cTn id="20" dur="500" tmFilter="0, 0; .2, .5; .8, .5; 1, 0"/>
+                                        <p:tgtEl>
+                                          <p:spTgt spid="2"/>
+                                        </p:tgtEl>
+                                      </p:cBhvr>
+                                    </p:animEffect>
+                                    <p:animScale>
+                                      <p:cBhvr>
+                                        <p:cTn id="21" dur="250" autoRev="1" fill="hold"/>
+                                        <p:tgtEl>
+                                          <p:spTgt spid="2"/>
+                                        </p:tgtEl>
+                                      </p:cBhvr>
+                                      <p:by x="105000" y="105000"/>
+                                    </p:animScale>
+                                  </p:childTnLst>
+                                </p:cTn>
+                              </p:par>
+                              <p:par>
+                                <p:cTn id="22" presetID="26" presetClass="emph" presetSubtype="0" repeatCount="indefinite" fill="hold" grpId="0" nodeType="withEffect">
+                                  <p:stCondLst>
+                                    <p:cond delay="0"/>
+                                  </p:stCondLst>
+                                  <p:childTnLst>
+                                    <p:animEffect transition="out" filter="fade">
+                                      <p:cBhvr>
+                                        <p:cTn id="23" dur="500" tmFilter="0, 0; .2, .5; .8, .5; 1, 0"/>
+                                        <p:tgtEl>
+                                          <p:spTgt spid="10"/>
+                                        </p:tgtEl>
+                                      </p:cBhvr>
+                                    </p:animEffect>
+                                    <p:animScale>
+                                      <p:cBhvr>
+                                        <p:cTn id="24" dur="250" autoRev="1" fill="hold"/>
+                                        <p:tgtEl>
+                                          <p:spTgt spid="10"/>
+                                        </p:tgtEl>
+                                      </p:cBhvr>
+                                      <p:by x="105000" y="105000"/>
+                                    </p:animScale>
+                                  </p:childTnLst>
+                                </p:cTn>
+                              </p:par>
                             </p:childTnLst>
                           </p:cTn>
                         </p:par>
@@ -7031,26 +7541,26 @@
                     </p:cTn>
                   </p:par>
                   <p:par>
-                    <p:cTn id="15" fill="hold">
+                    <p:cTn id="25" fill="hold">
                       <p:stCondLst>
                         <p:cond delay="indefinite"/>
                       </p:stCondLst>
                       <p:childTnLst>
                         <p:par>
-                          <p:cTn id="16" fill="hold">
+                          <p:cTn id="26" fill="hold">
                             <p:stCondLst>
                               <p:cond delay="0"/>
                             </p:stCondLst>
                             <p:childTnLst>
                               <p:par>
-                                <p:cTn id="17" presetID="1" presetClass="entr" presetSubtype="0" fill="hold" grpId="0" nodeType="clickEffect">
+                                <p:cTn id="27" presetID="1" presetClass="entr" presetSubtype="0" fill="hold" grpId="0" nodeType="clickEffect">
                                   <p:stCondLst>
                                     <p:cond delay="0"/>
                                   </p:stCondLst>
                                   <p:childTnLst>
                                     <p:set>
                                       <p:cBhvr>
-                                        <p:cTn id="18" dur="1" fill="hold">
+                                        <p:cTn id="28" dur="1" fill="hold">
                                           <p:stCondLst>
                                             <p:cond delay="0"/>
                                           </p:stCondLst>
@@ -7080,26 +7590,26 @@
                     </p:cTn>
                   </p:par>
                   <p:par>
-                    <p:cTn id="19" fill="hold">
+                    <p:cTn id="29" fill="hold">
                       <p:stCondLst>
                         <p:cond delay="indefinite"/>
                       </p:stCondLst>
                       <p:childTnLst>
                         <p:par>
-                          <p:cTn id="20" fill="hold">
+                          <p:cTn id="30" fill="hold">
                             <p:stCondLst>
                               <p:cond delay="0"/>
                             </p:stCondLst>
                             <p:childTnLst>
                               <p:par>
-                                <p:cTn id="21" presetID="1" presetClass="entr" presetSubtype="0" fill="hold" grpId="0" nodeType="clickEffect">
+                                <p:cTn id="31" presetID="1" presetClass="entr" presetSubtype="0" fill="hold" grpId="0" nodeType="clickEffect">
                                   <p:stCondLst>
                                     <p:cond delay="0"/>
                                   </p:stCondLst>
                                   <p:childTnLst>
                                     <p:set>
                                       <p:cBhvr>
-                                        <p:cTn id="22" dur="1" fill="hold">
+                                        <p:cTn id="32" dur="1" fill="hold">
                                           <p:stCondLst>
                                             <p:cond delay="0"/>
                                           </p:stCondLst>
@@ -7119,6 +7629,59 @@
                                         <p:strVal val="visible"/>
                                       </p:to>
                                     </p:set>
+                                  </p:childTnLst>
+                                </p:cTn>
+                              </p:par>
+                              <p:par>
+                                <p:cTn id="33" presetID="1" presetClass="entr" presetSubtype="0" fill="hold" grpId="1" nodeType="withEffect">
+                                  <p:stCondLst>
+                                    <p:cond delay="0"/>
+                                  </p:stCondLst>
+                                  <p:childTnLst>
+                                    <p:set>
+                                      <p:cBhvr>
+                                        <p:cTn id="34" dur="1" fill="hold">
+                                          <p:stCondLst>
+                                            <p:cond delay="0"/>
+                                          </p:stCondLst>
+                                        </p:cTn>
+                                        <p:tgtEl>
+                                          <p:spTgt spid="14"/>
+                                        </p:tgtEl>
+                                        <p:attrNameLst>
+                                          <p:attrName>style.visibility</p:attrName>
+                                        </p:attrNameLst>
+                                      </p:cBhvr>
+                                      <p:to>
+                                        <p:strVal val="visible"/>
+                                      </p:to>
+                                    </p:set>
+                                  </p:childTnLst>
+                                </p:cTn>
+                              </p:par>
+                              <p:par>
+                                <p:cTn id="35" presetID="26" presetClass="emph" presetSubtype="0" repeatCount="indefinite" fill="hold" grpId="0" nodeType="withEffect">
+                                  <p:stCondLst>
+                                    <p:cond delay="0"/>
+                                  </p:stCondLst>
+                                  <p:childTnLst>
+                                    <p:animEffect transition="out" filter="fade">
+                                      <p:cBhvr>
+                                        <p:cTn id="36" dur="500" tmFilter="0, 0; .2, .5; .8, .5; 1, 0"/>
+                                        <p:tgtEl>
+                                          <p:spTgt spid="14"/>
+                                        </p:tgtEl>
+                                      </p:cBhvr>
+                                    </p:animEffect>
+                                    <p:animScale>
+                                      <p:cBhvr>
+                                        <p:cTn id="37" dur="250" autoRev="1" fill="hold"/>
+                                        <p:tgtEl>
+                                          <p:spTgt spid="14"/>
+                                        </p:tgtEl>
+                                      </p:cBhvr>
+                                      <p:by x="105000" y="105000"/>
+                                    </p:animScale>
                                   </p:childTnLst>
                                 </p:cTn>
                               </p:par>
@@ -7150,7 +7713,13 @@
       </p:par>
     </p:tnLst>
     <p:bldLst>
-      <p:bldP spid="5" grpId="0" build="p" animBg="1"/>
+      <p:bldP spid="5" grpId="0" uiExpand="1" build="p" animBg="1"/>
+      <p:bldP spid="2" grpId="0" animBg="1"/>
+      <p:bldP spid="2" grpId="1" animBg="1"/>
+      <p:bldP spid="10" grpId="0" animBg="1"/>
+      <p:bldP spid="10" grpId="1" animBg="1"/>
+      <p:bldP spid="14" grpId="0" animBg="1"/>
+      <p:bldP spid="14" grpId="1" animBg="1"/>
     </p:bldLst>
   </p:timing>
 </p:sld>
@@ -9125,6 +9694,36 @@
           </a:p>
         </p:txBody>
       </p:sp>
+      <p:pic>
+        <p:nvPicPr>
+          <p:cNvPr id="7" name="Picture 6">
+            <a:extLst>
+              <a:ext uri="{FF2B5EF4-FFF2-40B4-BE49-F238E27FC236}">
+                <a16:creationId xmlns:a16="http://schemas.microsoft.com/office/drawing/2014/main" id="{70816FFD-88B1-874C-9DE3-96E2F83A7481}"/>
+              </a:ext>
+            </a:extLst>
+          </p:cNvPr>
+          <p:cNvPicPr>
+            <a:picLocks noChangeAspect="1"/>
+          </p:cNvPicPr>
+          <p:nvPr/>
+        </p:nvPicPr>
+        <p:blipFill>
+          <a:blip r:embed="rId2"/>
+          <a:stretch>
+            <a:fillRect/>
+          </a:stretch>
+        </p:blipFill>
+        <p:spPr>
+          <a:xfrm>
+            <a:off x="10985500" y="2858823"/>
+            <a:ext cx="1206500" cy="4127500"/>
+          </a:xfrm>
+          <a:prstGeom prst="rect">
+            <a:avLst/>
+          </a:prstGeom>
+        </p:spPr>
+      </p:pic>
     </p:spTree>
     <p:extLst>
       <p:ext uri="{BB962C8B-B14F-4D97-AF65-F5344CB8AC3E}">
@@ -9415,6 +10014,33 @@
                                         </p:cTn>
                                         <p:tgtEl>
                                           <p:spTgt spid="4"/>
+                                        </p:tgtEl>
+                                        <p:attrNameLst>
+                                          <p:attrName>style.visibility</p:attrName>
+                                        </p:attrNameLst>
+                                      </p:cBhvr>
+                                      <p:to>
+                                        <p:strVal val="visible"/>
+                                      </p:to>
+                                    </p:set>
+                                  </p:childTnLst>
+                                </p:cTn>
+                              </p:par>
+                              <p:par>
+                                <p:cTn id="27" presetID="1" presetClass="entr" presetSubtype="0" fill="hold" nodeType="withEffect">
+                                  <p:stCondLst>
+                                    <p:cond delay="0"/>
+                                  </p:stCondLst>
+                                  <p:childTnLst>
+                                    <p:set>
+                                      <p:cBhvr>
+                                        <p:cTn id="28" dur="1" fill="hold">
+                                          <p:stCondLst>
+                                            <p:cond delay="0"/>
+                                          </p:stCondLst>
+                                        </p:cTn>
+                                        <p:tgtEl>
+                                          <p:spTgt spid="7"/>
                                         </p:tgtEl>
                                         <p:attrNameLst>
                                           <p:attrName>style.visibility</p:attrName>
@@ -11299,6 +11925,36 @@
           </a:p>
         </p:txBody>
       </p:sp>
+      <p:pic>
+        <p:nvPicPr>
+          <p:cNvPr id="5" name="Picture 4">
+            <a:extLst>
+              <a:ext uri="{FF2B5EF4-FFF2-40B4-BE49-F238E27FC236}">
+                <a16:creationId xmlns:a16="http://schemas.microsoft.com/office/drawing/2014/main" id="{F66624F9-5157-3647-895F-2162B7137C0F}"/>
+              </a:ext>
+            </a:extLst>
+          </p:cNvPr>
+          <p:cNvPicPr>
+            <a:picLocks noChangeAspect="1"/>
+          </p:cNvPicPr>
+          <p:nvPr/>
+        </p:nvPicPr>
+        <p:blipFill>
+          <a:blip r:embed="rId2"/>
+          <a:stretch>
+            <a:fillRect/>
+          </a:stretch>
+        </p:blipFill>
+        <p:spPr>
+          <a:xfrm>
+            <a:off x="10871200" y="2743200"/>
+            <a:ext cx="1320800" cy="4114800"/>
+          </a:xfrm>
+          <a:prstGeom prst="rect">
+            <a:avLst/>
+          </a:prstGeom>
+        </p:spPr>
+      </p:pic>
     </p:spTree>
     <p:extLst>
       <p:ext uri="{BB962C8B-B14F-4D97-AF65-F5344CB8AC3E}">
@@ -11601,6 +12257,33 @@
                                   </p:childTnLst>
                                 </p:cTn>
                               </p:par>
+                              <p:par>
+                                <p:cTn id="27" presetID="1" presetClass="entr" presetSubtype="0" fill="hold" nodeType="withEffect">
+                                  <p:stCondLst>
+                                    <p:cond delay="0"/>
+                                  </p:stCondLst>
+                                  <p:childTnLst>
+                                    <p:set>
+                                      <p:cBhvr>
+                                        <p:cTn id="28" dur="1" fill="hold">
+                                          <p:stCondLst>
+                                            <p:cond delay="0"/>
+                                          </p:stCondLst>
+                                        </p:cTn>
+                                        <p:tgtEl>
+                                          <p:spTgt spid="5"/>
+                                        </p:tgtEl>
+                                        <p:attrNameLst>
+                                          <p:attrName>style.visibility</p:attrName>
+                                        </p:attrNameLst>
+                                      </p:cBhvr>
+                                      <p:to>
+                                        <p:strVal val="visible"/>
+                                      </p:to>
+                                    </p:set>
+                                  </p:childTnLst>
+                                </p:cTn>
+                              </p:par>
                             </p:childTnLst>
                           </p:cTn>
                         </p:par>
@@ -11899,33 +12582,6 @@
               <a:rPr lang="en-US" sz="2400" dirty="0"/>
               <a:t>, i.e. to opt for highest hourly rates in other districts.</a:t>
             </a:r>
-          </a:p>
-          <a:p>
-            <a:pPr marL="457200" indent="-457200">
-              <a:buFont typeface="+mj-lt"/>
-              <a:buAutoNum type="arabicPeriod"/>
-            </a:pPr>
-            <a:r>
-              <a:rPr lang="en-US" sz="2400" dirty="0"/>
-              <a:t>CFT data compares several PT rates at one step lower than FT rates, </a:t>
-            </a:r>
-            <a:r>
-              <a:rPr lang="en-US" sz="2400" b="1" dirty="0">
-                <a:solidFill>
-                  <a:srgbClr val="FFFF00"/>
-                </a:solidFill>
-              </a:rPr>
-              <a:t>lowering the actual ratio</a:t>
-            </a:r>
-            <a:r>
-              <a:rPr lang="en-US" sz="2400" dirty="0"/>
-              <a:t>.</a:t>
-            </a:r>
-            <a:endParaRPr lang="en-US" sz="2400" b="1" dirty="0">
-              <a:solidFill>
-                <a:srgbClr val="FFFF00"/>
-              </a:solidFill>
-            </a:endParaRPr>
           </a:p>
         </p:txBody>
       </p:sp>
@@ -12511,55 +13167,6 @@
                                           </p:stCondLst>
                                         </p:cTn>
                                         <p:tgtEl>
-                                          <p:spTgt spid="8">
-                                            <p:txEl>
-                                              <p:pRg st="6" end="6"/>
-                                            </p:txEl>
-                                          </p:spTgt>
-                                        </p:tgtEl>
-                                        <p:attrNameLst>
-                                          <p:attrName>style.visibility</p:attrName>
-                                        </p:attrNameLst>
-                                      </p:cBhvr>
-                                      <p:to>
-                                        <p:strVal val="visible"/>
-                                      </p:to>
-                                    </p:set>
-                                  </p:childTnLst>
-                                </p:cTn>
-                              </p:par>
-                            </p:childTnLst>
-                          </p:cTn>
-                        </p:par>
-                      </p:childTnLst>
-                    </p:cTn>
-                  </p:par>
-                  <p:par>
-                    <p:cTn id="31" fill="hold">
-                      <p:stCondLst>
-                        <p:cond delay="indefinite"/>
-                      </p:stCondLst>
-                      <p:childTnLst>
-                        <p:par>
-                          <p:cTn id="32" fill="hold">
-                            <p:stCondLst>
-                              <p:cond delay="0"/>
-                            </p:stCondLst>
-                            <p:childTnLst>
-                              <p:par>
-                                <p:cTn id="33" presetID="1" presetClass="entr" presetSubtype="0" fill="hold" grpId="0" nodeType="clickEffect">
-                                  <p:stCondLst>
-                                    <p:cond delay="0"/>
-                                  </p:stCondLst>
-                                  <p:childTnLst>
-                                    <p:set>
-                                      <p:cBhvr>
-                                        <p:cTn id="34" dur="1" fill="hold">
-                                          <p:stCondLst>
-                                            <p:cond delay="0"/>
-                                          </p:stCondLst>
-                                        </p:cTn>
-                                        <p:tgtEl>
                                           <p:spTgt spid="9"/>
                                         </p:tgtEl>
                                         <p:attrNameLst>
@@ -13025,7 +13632,7 @@
         </p:nvSpPr>
         <p:spPr>
           <a:xfrm>
-            <a:off x="8534401" y="5588000"/>
+            <a:off x="7129727" y="5516700"/>
             <a:ext cx="3657600" cy="1270000"/>
           </a:xfrm>
           <a:prstGeom prst="rect">
@@ -13058,6 +13665,36 @@
           </a:p>
         </p:txBody>
       </p:sp>
+      <p:pic>
+        <p:nvPicPr>
+          <p:cNvPr id="6" name="Picture 5">
+            <a:extLst>
+              <a:ext uri="{FF2B5EF4-FFF2-40B4-BE49-F238E27FC236}">
+                <a16:creationId xmlns:a16="http://schemas.microsoft.com/office/drawing/2014/main" id="{8DAB5930-3E4F-174F-B5B5-A864ECCEA974}"/>
+              </a:ext>
+            </a:extLst>
+          </p:cNvPr>
+          <p:cNvPicPr>
+            <a:picLocks noChangeAspect="1"/>
+          </p:cNvPicPr>
+          <p:nvPr/>
+        </p:nvPicPr>
+        <p:blipFill>
+          <a:blip r:embed="rId2"/>
+          <a:stretch>
+            <a:fillRect/>
+          </a:stretch>
+        </p:blipFill>
+        <p:spPr>
+          <a:xfrm>
+            <a:off x="10973307" y="2811462"/>
+            <a:ext cx="1257300" cy="4114800"/>
+          </a:xfrm>
+          <a:prstGeom prst="rect">
+            <a:avLst/>
+          </a:prstGeom>
+        </p:spPr>
+      </p:pic>
     </p:spTree>
     <p:extLst>
       <p:ext uri="{BB962C8B-B14F-4D97-AF65-F5344CB8AC3E}">
@@ -13344,6 +13981,33 @@
                                         </p:cTn>
                                         <p:tgtEl>
                                           <p:spTgt spid="4"/>
+                                        </p:tgtEl>
+                                        <p:attrNameLst>
+                                          <p:attrName>style.visibility</p:attrName>
+                                        </p:attrNameLst>
+                                      </p:cBhvr>
+                                      <p:to>
+                                        <p:strVal val="visible"/>
+                                      </p:to>
+                                    </p:set>
+                                  </p:childTnLst>
+                                </p:cTn>
+                              </p:par>
+                              <p:par>
+                                <p:cTn id="27" presetID="1" presetClass="entr" presetSubtype="0" fill="hold" nodeType="withEffect">
+                                  <p:stCondLst>
+                                    <p:cond delay="0"/>
+                                  </p:stCondLst>
+                                  <p:childTnLst>
+                                    <p:set>
+                                      <p:cBhvr>
+                                        <p:cTn id="28" dur="1" fill="hold">
+                                          <p:stCondLst>
+                                            <p:cond delay="0"/>
+                                          </p:stCondLst>
+                                        </p:cTn>
+                                        <p:tgtEl>
+                                          <p:spTgt spid="6"/>
                                         </p:tgtEl>
                                         <p:attrNameLst>
                                           <p:attrName>style.visibility</p:attrName>

</xml_diff>

<commit_message>
Added average pro-rata report
</commit_message>
<xml_diff>
--- a/cabrillo-summary.pptx
+++ b/cabrillo-summary.pptx
@@ -4,6 +4,9 @@
   <p:sldMasterIdLst>
     <p:sldMasterId id="2147483660" r:id="rId1"/>
   </p:sldMasterIdLst>
+  <p:handoutMasterIdLst>
+    <p:handoutMasterId r:id="rId15"/>
+  </p:handoutMasterIdLst>
   <p:sldIdLst>
     <p:sldId id="256" r:id="rId2"/>
     <p:sldId id="258" r:id="rId3"/>
@@ -20,7 +23,7 @@
     <p:sldId id="268" r:id="rId14"/>
   </p:sldIdLst>
   <p:sldSz cx="12192000" cy="6858000"/>
-  <p:notesSz cx="6858000" cy="9144000"/>
+  <p:notesSz cx="9144000" cy="6858000"/>
   <p:defaultTextStyle>
     <a:defPPr>
       <a:defRPr lang="en-US"/>
@@ -124,6 +127,195 @@
 </p:presentation>
 </file>
 
+<file path=ppt/handoutMasters/handoutMaster1.xml><?xml version="1.0" encoding="utf-8"?>
+<p:handoutMaster xmlns:a="http://schemas.openxmlformats.org/drawingml/2006/main" xmlns:r="http://schemas.openxmlformats.org/officeDocument/2006/relationships" xmlns:p="http://schemas.openxmlformats.org/presentationml/2006/main">
+  <p:cSld>
+    <p:bg>
+      <p:bgRef idx="1001">
+        <a:schemeClr val="bg1"/>
+      </p:bgRef>
+    </p:bg>
+    <p:spTree>
+      <p:nvGrpSpPr>
+        <p:cNvPr id="1" name=""/>
+        <p:cNvGrpSpPr/>
+        <p:nvPr/>
+      </p:nvGrpSpPr>
+      <p:grpSpPr>
+        <a:xfrm>
+          <a:off x="0" y="0"/>
+          <a:ext cx="0" cy="0"/>
+          <a:chOff x="0" y="0"/>
+          <a:chExt cx="0" cy="0"/>
+        </a:xfrm>
+      </p:grpSpPr>
+      <p:sp>
+        <p:nvSpPr>
+          <p:cNvPr id="2" name="Header Placeholder 1">
+            <a:extLst>
+              <a:ext uri="{FF2B5EF4-FFF2-40B4-BE49-F238E27FC236}">
+                <a16:creationId xmlns:a16="http://schemas.microsoft.com/office/drawing/2014/main" id="{E97241F4-5C79-4C45-97F5-5F6D06615216}"/>
+              </a:ext>
+            </a:extLst>
+          </p:cNvPr>
+          <p:cNvSpPr>
+            <a:spLocks noGrp="1"/>
+          </p:cNvSpPr>
+          <p:nvPr>
+            <p:ph type="hdr" sz="quarter"/>
+          </p:nvPr>
+        </p:nvSpPr>
+        <p:spPr>
+          <a:xfrm>
+            <a:off x="0" y="1"/>
+            <a:ext cx="3962400" cy="344091"/>
+          </a:xfrm>
+          <a:prstGeom prst="rect">
+            <a:avLst/>
+          </a:prstGeom>
+        </p:spPr>
+        <p:txBody>
+          <a:bodyPr vert="horz" lIns="91440" tIns="45720" rIns="91440" bIns="45720" rtlCol="0"/>
+          <a:lstStyle>
+            <a:lvl1pPr algn="l">
+              <a:defRPr sz="1200"/>
+            </a:lvl1pPr>
+          </a:lstStyle>
+          <a:p>
+            <a:endParaRPr lang="en-US"/>
+          </a:p>
+        </p:txBody>
+      </p:sp>
+      <p:sp>
+        <p:nvSpPr>
+          <p:cNvPr id="3" name="Date Placeholder 2">
+            <a:extLst>
+              <a:ext uri="{FF2B5EF4-FFF2-40B4-BE49-F238E27FC236}">
+                <a16:creationId xmlns:a16="http://schemas.microsoft.com/office/drawing/2014/main" id="{0F114C06-BCFD-7A4F-839A-3D1945AE96A4}"/>
+              </a:ext>
+            </a:extLst>
+          </p:cNvPr>
+          <p:cNvSpPr>
+            <a:spLocks noGrp="1"/>
+          </p:cNvSpPr>
+          <p:nvPr>
+            <p:ph type="dt" sz="quarter" idx="1"/>
+          </p:nvPr>
+        </p:nvSpPr>
+        <p:spPr>
+          <a:xfrm>
+            <a:off x="5179484" y="1"/>
+            <a:ext cx="3962400" cy="344091"/>
+          </a:xfrm>
+          <a:prstGeom prst="rect">
+            <a:avLst/>
+          </a:prstGeom>
+        </p:spPr>
+        <p:txBody>
+          <a:bodyPr vert="horz" lIns="91440" tIns="45720" rIns="91440" bIns="45720" rtlCol="0"/>
+          <a:lstStyle>
+            <a:lvl1pPr algn="r">
+              <a:defRPr sz="1200"/>
+            </a:lvl1pPr>
+          </a:lstStyle>
+          <a:p>
+            <a:fld id="{F8B221F9-44F8-124F-9B33-61385ED0E192}" type="datetimeFigureOut">
+              <a:rPr lang="en-US" smtClean="0"/>
+              <a:t>6/4/18</a:t>
+            </a:fld>
+            <a:endParaRPr lang="en-US"/>
+          </a:p>
+        </p:txBody>
+      </p:sp>
+      <p:sp>
+        <p:nvSpPr>
+          <p:cNvPr id="4" name="Footer Placeholder 3">
+            <a:extLst>
+              <a:ext uri="{FF2B5EF4-FFF2-40B4-BE49-F238E27FC236}">
+                <a16:creationId xmlns:a16="http://schemas.microsoft.com/office/drawing/2014/main" id="{DE5EDB93-1FEA-7E4F-8701-09F50929D541}"/>
+              </a:ext>
+            </a:extLst>
+          </p:cNvPr>
+          <p:cNvSpPr>
+            <a:spLocks noGrp="1"/>
+          </p:cNvSpPr>
+          <p:nvPr>
+            <p:ph type="ftr" sz="quarter" idx="2"/>
+          </p:nvPr>
+        </p:nvSpPr>
+        <p:spPr>
+          <a:xfrm>
+            <a:off x="0" y="6513910"/>
+            <a:ext cx="3962400" cy="344090"/>
+          </a:xfrm>
+          <a:prstGeom prst="rect">
+            <a:avLst/>
+          </a:prstGeom>
+        </p:spPr>
+        <p:txBody>
+          <a:bodyPr vert="horz" lIns="91440" tIns="45720" rIns="91440" bIns="45720" rtlCol="0" anchor="b"/>
+          <a:lstStyle>
+            <a:lvl1pPr algn="l">
+              <a:defRPr sz="1200"/>
+            </a:lvl1pPr>
+          </a:lstStyle>
+          <a:p>
+            <a:endParaRPr lang="en-US"/>
+          </a:p>
+        </p:txBody>
+      </p:sp>
+      <p:sp>
+        <p:nvSpPr>
+          <p:cNvPr id="5" name="Slide Number Placeholder 4">
+            <a:extLst>
+              <a:ext uri="{FF2B5EF4-FFF2-40B4-BE49-F238E27FC236}">
+                <a16:creationId xmlns:a16="http://schemas.microsoft.com/office/drawing/2014/main" id="{5ADA7840-8494-0C4B-A391-4B6A0484A4CA}"/>
+              </a:ext>
+            </a:extLst>
+          </p:cNvPr>
+          <p:cNvSpPr>
+            <a:spLocks noGrp="1"/>
+          </p:cNvSpPr>
+          <p:nvPr>
+            <p:ph type="sldNum" sz="quarter" idx="3"/>
+          </p:nvPr>
+        </p:nvSpPr>
+        <p:spPr>
+          <a:xfrm>
+            <a:off x="5179484" y="6513910"/>
+            <a:ext cx="3962400" cy="344090"/>
+          </a:xfrm>
+          <a:prstGeom prst="rect">
+            <a:avLst/>
+          </a:prstGeom>
+        </p:spPr>
+        <p:txBody>
+          <a:bodyPr vert="horz" lIns="91440" tIns="45720" rIns="91440" bIns="45720" rtlCol="0" anchor="b"/>
+          <a:lstStyle>
+            <a:lvl1pPr algn="r">
+              <a:defRPr sz="1200"/>
+            </a:lvl1pPr>
+          </a:lstStyle>
+          <a:p>
+            <a:fld id="{F952380E-7FB5-FE4A-ACE4-1D8887FDE7BB}" type="slidenum">
+              <a:rPr lang="en-US" smtClean="0"/>
+              <a:t>‹#›</a:t>
+            </a:fld>
+            <a:endParaRPr lang="en-US"/>
+          </a:p>
+        </p:txBody>
+      </p:sp>
+    </p:spTree>
+    <p:extLst>
+      <p:ext uri="{BB962C8B-B14F-4D97-AF65-F5344CB8AC3E}">
+        <p14:creationId xmlns:p14="http://schemas.microsoft.com/office/powerpoint/2010/main" val="4089702341"/>
+      </p:ext>
+    </p:extLst>
+  </p:cSld>
+  <p:clrMap bg1="lt1" tx1="dk1" bg2="lt2" tx2="dk2" accent1="accent1" accent2="accent2" accent3="accent3" accent4="accent4" accent5="accent5" accent6="accent6" hlink="hlink" folHlink="folHlink"/>
+</p:handoutMaster>
+</file>
+
 <file path=ppt/slideLayouts/slideLayout1.xml><?xml version="1.0" encoding="utf-8"?>
 <p:sldLayout xmlns:a="http://schemas.openxmlformats.org/drawingml/2006/main" xmlns:r="http://schemas.openxmlformats.org/officeDocument/2006/relationships" xmlns:p="http://schemas.openxmlformats.org/presentationml/2006/main" type="title" preserve="1">
   <p:cSld name="Title Slide">
@@ -255,7 +447,7 @@
           <a:p>
             <a:fld id="{5A6A7BB8-834D-D94B-8536-405F1211879C}" type="datetimeFigureOut">
               <a:rPr lang="en-US" smtClean="0"/>
-              <a:t>6/3/18</a:t>
+              <a:t>6/4/18</a:t>
             </a:fld>
             <a:endParaRPr lang="en-US"/>
           </a:p>
@@ -425,7 +617,7 @@
           <a:p>
             <a:fld id="{5A6A7BB8-834D-D94B-8536-405F1211879C}" type="datetimeFigureOut">
               <a:rPr lang="en-US" smtClean="0"/>
-              <a:t>6/3/18</a:t>
+              <a:t>6/4/18</a:t>
             </a:fld>
             <a:endParaRPr lang="en-US"/>
           </a:p>
@@ -605,7 +797,7 @@
           <a:p>
             <a:fld id="{5A6A7BB8-834D-D94B-8536-405F1211879C}" type="datetimeFigureOut">
               <a:rPr lang="en-US" smtClean="0"/>
-              <a:t>6/3/18</a:t>
+              <a:t>6/4/18</a:t>
             </a:fld>
             <a:endParaRPr lang="en-US"/>
           </a:p>
@@ -775,7 +967,7 @@
           <a:p>
             <a:fld id="{5A6A7BB8-834D-D94B-8536-405F1211879C}" type="datetimeFigureOut">
               <a:rPr lang="en-US" smtClean="0"/>
-              <a:t>6/3/18</a:t>
+              <a:t>6/4/18</a:t>
             </a:fld>
             <a:endParaRPr lang="en-US"/>
           </a:p>
@@ -1021,7 +1213,7 @@
           <a:p>
             <a:fld id="{5A6A7BB8-834D-D94B-8536-405F1211879C}" type="datetimeFigureOut">
               <a:rPr lang="en-US" smtClean="0"/>
-              <a:t>6/3/18</a:t>
+              <a:t>6/4/18</a:t>
             </a:fld>
             <a:endParaRPr lang="en-US"/>
           </a:p>
@@ -1253,7 +1445,7 @@
           <a:p>
             <a:fld id="{5A6A7BB8-834D-D94B-8536-405F1211879C}" type="datetimeFigureOut">
               <a:rPr lang="en-US" smtClean="0"/>
-              <a:t>6/3/18</a:t>
+              <a:t>6/4/18</a:t>
             </a:fld>
             <a:endParaRPr lang="en-US"/>
           </a:p>
@@ -1620,7 +1812,7 @@
           <a:p>
             <a:fld id="{5A6A7BB8-834D-D94B-8536-405F1211879C}" type="datetimeFigureOut">
               <a:rPr lang="en-US" smtClean="0"/>
-              <a:t>6/3/18</a:t>
+              <a:t>6/4/18</a:t>
             </a:fld>
             <a:endParaRPr lang="en-US"/>
           </a:p>
@@ -1738,7 +1930,7 @@
           <a:p>
             <a:fld id="{5A6A7BB8-834D-D94B-8536-405F1211879C}" type="datetimeFigureOut">
               <a:rPr lang="en-US" smtClean="0"/>
-              <a:t>6/3/18</a:t>
+              <a:t>6/4/18</a:t>
             </a:fld>
             <a:endParaRPr lang="en-US"/>
           </a:p>
@@ -1833,7 +2025,7 @@
           <a:p>
             <a:fld id="{5A6A7BB8-834D-D94B-8536-405F1211879C}" type="datetimeFigureOut">
               <a:rPr lang="en-US" smtClean="0"/>
-              <a:t>6/3/18</a:t>
+              <a:t>6/4/18</a:t>
             </a:fld>
             <a:endParaRPr lang="en-US"/>
           </a:p>
@@ -2110,7 +2302,7 @@
           <a:p>
             <a:fld id="{5A6A7BB8-834D-D94B-8536-405F1211879C}" type="datetimeFigureOut">
               <a:rPr lang="en-US" smtClean="0"/>
-              <a:t>6/3/18</a:t>
+              <a:t>6/4/18</a:t>
             </a:fld>
             <a:endParaRPr lang="en-US"/>
           </a:p>
@@ -2367,7 +2559,7 @@
           <a:p>
             <a:fld id="{5A6A7BB8-834D-D94B-8536-405F1211879C}" type="datetimeFigureOut">
               <a:rPr lang="en-US" smtClean="0"/>
-              <a:t>6/3/18</a:t>
+              <a:t>6/4/18</a:t>
             </a:fld>
             <a:endParaRPr lang="en-US"/>
           </a:p>
@@ -2580,7 +2772,7 @@
           <a:p>
             <a:fld id="{5A6A7BB8-834D-D94B-8536-405F1211879C}" type="datetimeFigureOut">
               <a:rPr lang="en-US" smtClean="0"/>
-              <a:t>6/3/18</a:t>
+              <a:t>6/4/18</a:t>
             </a:fld>
             <a:endParaRPr lang="en-US"/>
           </a:p>
@@ -5543,8 +5735,8 @@
           </a:graphicData>
         </a:graphic>
       </p:graphicFrame>
-      <mc:AlternateContent xmlns:mc="http://schemas.openxmlformats.org/markup-compatibility/2006">
-        <mc:Choice xmlns:a14="http://schemas.microsoft.com/office/drawing/2010/main" Requires="a14">
+      <mc:AlternateContent xmlns:mc="http://schemas.openxmlformats.org/markup-compatibility/2006" xmlns:a14="http://schemas.microsoft.com/office/drawing/2010/main">
+        <mc:Choice Requires="a14">
           <p:sp>
             <p:nvSpPr>
               <p:cNvPr id="4" name="Rectangle 3">
@@ -5744,7 +5936,7 @@
             </p:txBody>
           </p:sp>
         </mc:Choice>
-        <mc:Fallback>
+        <mc:Fallback xmlns="">
           <p:sp>
             <p:nvSpPr>
               <p:cNvPr id="4" name="Rectangle 3">
@@ -6117,7 +6309,7 @@
                   <a:srgbClr val="FFFF00"/>
                 </a:solidFill>
               </a:rPr>
-              <a:t>15/72</a:t>
+              <a:t>13/72</a:t>
             </a:r>
           </a:p>
           <a:p>
@@ -6136,7 +6328,7 @@
                   <a:srgbClr val="FFFF00"/>
                 </a:solidFill>
               </a:rPr>
-              <a:t>79</a:t>
+              <a:t>82</a:t>
             </a:r>
             <a:r>
               <a:rPr lang="en-US" sz="2400" b="1" baseline="30000" dirty="0">
@@ -6144,7 +6336,7 @@
                   <a:srgbClr val="FFFF00"/>
                 </a:solidFill>
               </a:rPr>
-              <a:t>th</a:t>
+              <a:t>nd</a:t>
             </a:r>
             <a:r>
               <a:rPr lang="en-US" sz="2400" b="1" dirty="0">
@@ -6159,7 +6351,7 @@
             <a:pPr algn="ctr"/>
             <a:r>
               <a:rPr lang="en-US" sz="2400" b="1" dirty="0"/>
-              <a:t>(lower first quartile)</a:t>
+              <a:t>(mid first quartile)</a:t>
             </a:r>
           </a:p>
         </p:txBody>
@@ -6226,10 +6418,10 @@
       </p:pic>
       <p:pic>
         <p:nvPicPr>
-          <p:cNvPr id="8" name="Picture 7">
+          <p:cNvPr id="9" name="Picture 8">
             <a:extLst>
               <a:ext uri="{FF2B5EF4-FFF2-40B4-BE49-F238E27FC236}">
-                <a16:creationId xmlns:a16="http://schemas.microsoft.com/office/drawing/2014/main" id="{F90C6DA4-C942-B84E-99AA-828464B936D8}"/>
+                <a16:creationId xmlns:a16="http://schemas.microsoft.com/office/drawing/2014/main" id="{C29EFC7A-FC4D-3E4D-876D-D925577A1678}"/>
               </a:ext>
             </a:extLst>
           </p:cNvPr>
@@ -6246,8 +6438,8 @@
         </p:blipFill>
         <p:spPr>
           <a:xfrm>
-            <a:off x="10412278" y="1715129"/>
-            <a:ext cx="1257300" cy="4114800"/>
+            <a:off x="10507721" y="1771517"/>
+            <a:ext cx="1155700" cy="4025900"/>
           </a:xfrm>
           <a:prstGeom prst="rect">
             <a:avLst/>
@@ -6469,7 +6661,7 @@
                                           </p:stCondLst>
                                         </p:cTn>
                                         <p:tgtEl>
-                                          <p:spTgt spid="8"/>
+                                          <p:spTgt spid="9"/>
                                         </p:tgtEl>
                                         <p:attrNameLst>
                                           <p:attrName>style.visibility</p:attrName>
@@ -6842,7 +7034,7 @@
             <a:pPr algn="ctr"/>
             <a:r>
               <a:rPr lang="en-US" sz="2400" b="1" dirty="0"/>
-              <a:t>(lower first quartile)</a:t>
+              <a:t>(mid first quartile)</a:t>
             </a:r>
           </a:p>
         </p:txBody>
@@ -6907,36 +7099,6 @@
           </a:prstGeom>
         </p:spPr>
       </p:pic>
-      <p:pic>
-        <p:nvPicPr>
-          <p:cNvPr id="8" name="Picture 7">
-            <a:extLst>
-              <a:ext uri="{FF2B5EF4-FFF2-40B4-BE49-F238E27FC236}">
-                <a16:creationId xmlns:a16="http://schemas.microsoft.com/office/drawing/2014/main" id="{878AA4A0-B7A5-9849-AB70-E4B8E06605EF}"/>
-              </a:ext>
-            </a:extLst>
-          </p:cNvPr>
-          <p:cNvPicPr>
-            <a:picLocks noChangeAspect="1"/>
-          </p:cNvPicPr>
-          <p:nvPr/>
-        </p:nvPicPr>
-        <p:blipFill>
-          <a:blip r:embed="rId4"/>
-          <a:stretch>
-            <a:fillRect/>
-          </a:stretch>
-        </p:blipFill>
-        <p:spPr>
-          <a:xfrm>
-            <a:off x="10430536" y="-186823"/>
-            <a:ext cx="1257300" cy="4114800"/>
-          </a:xfrm>
-          <a:prstGeom prst="rect">
-            <a:avLst/>
-          </a:prstGeom>
-        </p:spPr>
-      </p:pic>
       <p:sp>
         <p:nvSpPr>
           <p:cNvPr id="5" name="Rectangle 4">
@@ -7142,7 +7304,7 @@
         </p:nvSpPr>
         <p:spPr>
           <a:xfrm>
-            <a:off x="7207274" y="-18288"/>
+            <a:off x="7259033" y="-18288"/>
             <a:ext cx="365760" cy="738421"/>
           </a:xfrm>
           <a:prstGeom prst="upArrow">
@@ -7177,53 +7339,6 @@
       </p:sp>
       <p:sp>
         <p:nvSpPr>
-          <p:cNvPr id="10" name="Up Arrow 9">
-            <a:extLst>
-              <a:ext uri="{FF2B5EF4-FFF2-40B4-BE49-F238E27FC236}">
-                <a16:creationId xmlns:a16="http://schemas.microsoft.com/office/drawing/2014/main" id="{EE5E7B6D-E0FB-DF4D-9329-E6694D9E5151}"/>
-              </a:ext>
-            </a:extLst>
-          </p:cNvPr>
-          <p:cNvSpPr/>
-          <p:nvPr/>
-        </p:nvSpPr>
-        <p:spPr>
-          <a:xfrm>
-            <a:off x="10931170" y="-18288"/>
-            <a:ext cx="365760" cy="738421"/>
-          </a:xfrm>
-          <a:prstGeom prst="upArrow">
-            <a:avLst/>
-          </a:prstGeom>
-          <a:solidFill>
-            <a:srgbClr val="92D050"/>
-          </a:solidFill>
-        </p:spPr>
-        <p:style>
-          <a:lnRef idx="0">
-            <a:schemeClr val="accent2"/>
-          </a:lnRef>
-          <a:fillRef idx="3">
-            <a:schemeClr val="accent2"/>
-          </a:fillRef>
-          <a:effectRef idx="3">
-            <a:schemeClr val="accent2"/>
-          </a:effectRef>
-          <a:fontRef idx="minor">
-            <a:schemeClr val="lt1"/>
-          </a:fontRef>
-        </p:style>
-        <p:txBody>
-          <a:bodyPr rtlCol="0" anchor="ctr"/>
-          <a:lstStyle/>
-          <a:p>
-            <a:pPr algn="ctr"/>
-            <a:endParaRPr lang="en-US"/>
-          </a:p>
-        </p:txBody>
-      </p:sp>
-      <p:sp>
-        <p:nvSpPr>
           <p:cNvPr id="14" name="Up Arrow 13">
             <a:extLst>
               <a:ext uri="{FF2B5EF4-FFF2-40B4-BE49-F238E27FC236}">
@@ -7236,7 +7351,7 @@
         </p:nvSpPr>
         <p:spPr>
           <a:xfrm rot="10800000">
-            <a:off x="3504742" y="2310384"/>
+            <a:off x="3556501" y="2310384"/>
             <a:ext cx="365760" cy="738421"/>
           </a:xfrm>
           <a:prstGeom prst="upArrow">
@@ -7257,6 +7372,83 @@
           </a:fillRef>
           <a:effectRef idx="0">
             <a:schemeClr val="accent5"/>
+          </a:effectRef>
+          <a:fontRef idx="minor">
+            <a:schemeClr val="lt1"/>
+          </a:fontRef>
+        </p:style>
+        <p:txBody>
+          <a:bodyPr rtlCol="0" anchor="ctr"/>
+          <a:lstStyle/>
+          <a:p>
+            <a:pPr algn="ctr"/>
+            <a:endParaRPr lang="en-US"/>
+          </a:p>
+        </p:txBody>
+      </p:sp>
+      <p:pic>
+        <p:nvPicPr>
+          <p:cNvPr id="15" name="Picture 14">
+            <a:extLst>
+              <a:ext uri="{FF2B5EF4-FFF2-40B4-BE49-F238E27FC236}">
+                <a16:creationId xmlns:a16="http://schemas.microsoft.com/office/drawing/2014/main" id="{861A1598-FFED-A242-8A7C-2D72D4DC3E09}"/>
+              </a:ext>
+            </a:extLst>
+          </p:cNvPr>
+          <p:cNvPicPr>
+            <a:picLocks noChangeAspect="1"/>
+          </p:cNvPicPr>
+          <p:nvPr/>
+        </p:nvPicPr>
+        <p:blipFill>
+          <a:blip r:embed="rId4"/>
+          <a:stretch>
+            <a:fillRect/>
+          </a:stretch>
+        </p:blipFill>
+        <p:spPr>
+          <a:xfrm>
+            <a:off x="10507721" y="-126292"/>
+            <a:ext cx="1155700" cy="4025900"/>
+          </a:xfrm>
+          <a:prstGeom prst="rect">
+            <a:avLst/>
+          </a:prstGeom>
+        </p:spPr>
+      </p:pic>
+      <p:sp>
+        <p:nvSpPr>
+          <p:cNvPr id="10" name="Up Arrow 9">
+            <a:extLst>
+              <a:ext uri="{FF2B5EF4-FFF2-40B4-BE49-F238E27FC236}">
+                <a16:creationId xmlns:a16="http://schemas.microsoft.com/office/drawing/2014/main" id="{EE5E7B6D-E0FB-DF4D-9329-E6694D9E5151}"/>
+              </a:ext>
+            </a:extLst>
+          </p:cNvPr>
+          <p:cNvSpPr/>
+          <p:nvPr/>
+        </p:nvSpPr>
+        <p:spPr>
+          <a:xfrm>
+            <a:off x="10982929" y="-18288"/>
+            <a:ext cx="365760" cy="738421"/>
+          </a:xfrm>
+          <a:prstGeom prst="upArrow">
+            <a:avLst/>
+          </a:prstGeom>
+          <a:solidFill>
+            <a:srgbClr val="92D050"/>
+          </a:solidFill>
+        </p:spPr>
+        <p:style>
+          <a:lnRef idx="0">
+            <a:schemeClr val="accent2"/>
+          </a:lnRef>
+          <a:fillRef idx="3">
+            <a:schemeClr val="accent2"/>
+          </a:fillRef>
+          <a:effectRef idx="3">
+            <a:schemeClr val="accent2"/>
           </a:effectRef>
           <a:fontRef idx="minor">
             <a:schemeClr val="lt1"/>
@@ -7716,10 +7908,10 @@
       <p:bldP spid="5" grpId="0" uiExpand="1" build="p" animBg="1"/>
       <p:bldP spid="2" grpId="0" animBg="1"/>
       <p:bldP spid="2" grpId="1" animBg="1"/>
+      <p:bldP spid="14" grpId="0" animBg="1"/>
+      <p:bldP spid="14" grpId="1" animBg="1"/>
       <p:bldP spid="10" grpId="0" animBg="1"/>
       <p:bldP spid="10" grpId="1" animBg="1"/>
-      <p:bldP spid="14" grpId="0" animBg="1"/>
-      <p:bldP spid="14" grpId="1" animBg="1"/>
     </p:bldLst>
   </p:timing>
 </p:sld>
@@ -13571,7 +13763,7 @@
                   <a:srgbClr val="FFFF00"/>
                 </a:solidFill>
               </a:rPr>
-              <a:t>15/72</a:t>
+              <a:t>13/72</a:t>
             </a:r>
           </a:p>
           <a:p>
@@ -13590,7 +13782,7 @@
                   <a:srgbClr val="FFFF00"/>
                 </a:solidFill>
               </a:rPr>
-              <a:t>79</a:t>
+              <a:t>82</a:t>
             </a:r>
             <a:r>
               <a:rPr lang="en-US" sz="2400" b="1" baseline="30000" dirty="0">
@@ -13598,7 +13790,7 @@
                   <a:srgbClr val="FFFF00"/>
                 </a:solidFill>
               </a:rPr>
-              <a:t>th</a:t>
+              <a:t>nd</a:t>
             </a:r>
             <a:r>
               <a:rPr lang="en-US" sz="2400" b="1" dirty="0">
@@ -13613,7 +13805,7 @@
             <a:pPr algn="ctr"/>
             <a:r>
               <a:rPr lang="en-US" sz="2400" b="1" dirty="0"/>
-              <a:t>(lower first quartile)</a:t>
+              <a:t>(mid first quartile)</a:t>
             </a:r>
           </a:p>
         </p:txBody>
@@ -13667,10 +13859,10 @@
       </p:sp>
       <p:pic>
         <p:nvPicPr>
-          <p:cNvPr id="6" name="Picture 5">
+          <p:cNvPr id="7" name="Picture 6">
             <a:extLst>
               <a:ext uri="{FF2B5EF4-FFF2-40B4-BE49-F238E27FC236}">
-                <a16:creationId xmlns:a16="http://schemas.microsoft.com/office/drawing/2014/main" id="{8DAB5930-3E4F-174F-B5B5-A864ECCEA974}"/>
+                <a16:creationId xmlns:a16="http://schemas.microsoft.com/office/drawing/2014/main" id="{7C5FF40C-3388-B14E-8B2B-46349E8685D4}"/>
               </a:ext>
             </a:extLst>
           </p:cNvPr>
@@ -13687,8 +13879,8 @@
         </p:blipFill>
         <p:spPr>
           <a:xfrm>
-            <a:off x="10973307" y="2811462"/>
-            <a:ext cx="1257300" cy="4114800"/>
+            <a:off x="11019763" y="2853600"/>
+            <a:ext cx="1155700" cy="4025900"/>
           </a:xfrm>
           <a:prstGeom prst="rect">
             <a:avLst/>
@@ -14007,7 +14199,7 @@
                                           </p:stCondLst>
                                         </p:cTn>
                                         <p:tgtEl>
-                                          <p:spTgt spid="6"/>
+                                          <p:spTgt spid="7"/>
                                         </p:tgtEl>
                                         <p:attrNameLst>
                                           <p:attrName>style.visibility</p:attrName>
@@ -14315,4 +14507,299 @@
     </a:ext>
   </a:extLst>
 </a:theme>
+</file>
+
+<file path=ppt/theme/theme2.xml><?xml version="1.0" encoding="utf-8"?>
+<a:theme xmlns:a="http://schemas.openxmlformats.org/drawingml/2006/main" name="Office Theme">
+  <a:themeElements>
+    <a:clrScheme name="Office">
+      <a:dk1>
+        <a:sysClr val="windowText" lastClr="000000"/>
+      </a:dk1>
+      <a:lt1>
+        <a:sysClr val="window" lastClr="FFFFFF"/>
+      </a:lt1>
+      <a:dk2>
+        <a:srgbClr val="44546A"/>
+      </a:dk2>
+      <a:lt2>
+        <a:srgbClr val="E7E6E6"/>
+      </a:lt2>
+      <a:accent1>
+        <a:srgbClr val="4472C4"/>
+      </a:accent1>
+      <a:accent2>
+        <a:srgbClr val="ED7D31"/>
+      </a:accent2>
+      <a:accent3>
+        <a:srgbClr val="A5A5A5"/>
+      </a:accent3>
+      <a:accent4>
+        <a:srgbClr val="FFC000"/>
+      </a:accent4>
+      <a:accent5>
+        <a:srgbClr val="5B9BD5"/>
+      </a:accent5>
+      <a:accent6>
+        <a:srgbClr val="70AD47"/>
+      </a:accent6>
+      <a:hlink>
+        <a:srgbClr val="0563C1"/>
+      </a:hlink>
+      <a:folHlink>
+        <a:srgbClr val="954F72"/>
+      </a:folHlink>
+    </a:clrScheme>
+    <a:fontScheme name="Office">
+      <a:majorFont>
+        <a:latin typeface="Calibri Light" panose="020F0302020204030204"/>
+        <a:ea typeface=""/>
+        <a:cs typeface=""/>
+        <a:font script="Jpan" typeface="游ゴシック Light"/>
+        <a:font script="Hang" typeface="맑은 고딕"/>
+        <a:font script="Hans" typeface="等线 Light"/>
+        <a:font script="Hant" typeface="新細明體"/>
+        <a:font script="Arab" typeface="Times New Roman"/>
+        <a:font script="Hebr" typeface="Times New Roman"/>
+        <a:font script="Thai" typeface="Angsana New"/>
+        <a:font script="Ethi" typeface="Nyala"/>
+        <a:font script="Beng" typeface="Vrinda"/>
+        <a:font script="Gujr" typeface="Shruti"/>
+        <a:font script="Khmr" typeface="MoolBoran"/>
+        <a:font script="Knda" typeface="Tunga"/>
+        <a:font script="Guru" typeface="Raavi"/>
+        <a:font script="Cans" typeface="Euphemia"/>
+        <a:font script="Cher" typeface="Plantagenet Cherokee"/>
+        <a:font script="Yiii" typeface="Microsoft Yi Baiti"/>
+        <a:font script="Tibt" typeface="Microsoft Himalaya"/>
+        <a:font script="Thaa" typeface="MV Boli"/>
+        <a:font script="Deva" typeface="Mangal"/>
+        <a:font script="Telu" typeface="Gautami"/>
+        <a:font script="Taml" typeface="Latha"/>
+        <a:font script="Syrc" typeface="Estrangelo Edessa"/>
+        <a:font script="Orya" typeface="Kalinga"/>
+        <a:font script="Mlym" typeface="Kartika"/>
+        <a:font script="Laoo" typeface="DokChampa"/>
+        <a:font script="Sinh" typeface="Iskoola Pota"/>
+        <a:font script="Mong" typeface="Mongolian Baiti"/>
+        <a:font script="Viet" typeface="Times New Roman"/>
+        <a:font script="Uigh" typeface="Microsoft Uighur"/>
+        <a:font script="Geor" typeface="Sylfaen"/>
+        <a:font script="Armn" typeface="Arial"/>
+        <a:font script="Bugi" typeface="Leelawadee UI"/>
+        <a:font script="Bopo" typeface="Microsoft JhengHei"/>
+        <a:font script="Java" typeface="Javanese Text"/>
+        <a:font script="Lisu" typeface="Segoe UI"/>
+        <a:font script="Mymr" typeface="Myanmar Text"/>
+        <a:font script="Nkoo" typeface="Ebrima"/>
+        <a:font script="Olck" typeface="Nirmala UI"/>
+        <a:font script="Osma" typeface="Ebrima"/>
+        <a:font script="Phag" typeface="Phagspa"/>
+        <a:font script="Syrn" typeface="Estrangelo Edessa"/>
+        <a:font script="Syrj" typeface="Estrangelo Edessa"/>
+        <a:font script="Syre" typeface="Estrangelo Edessa"/>
+        <a:font script="Sora" typeface="Nirmala UI"/>
+        <a:font script="Tale" typeface="Microsoft Tai Le"/>
+        <a:font script="Talu" typeface="Microsoft New Tai Lue"/>
+        <a:font script="Tfng" typeface="Ebrima"/>
+      </a:majorFont>
+      <a:minorFont>
+        <a:latin typeface="Calibri" panose="020F0502020204030204"/>
+        <a:ea typeface=""/>
+        <a:cs typeface=""/>
+        <a:font script="Jpan" typeface="游ゴシック"/>
+        <a:font script="Hang" typeface="맑은 고딕"/>
+        <a:font script="Hans" typeface="等线"/>
+        <a:font script="Hant" typeface="新細明體"/>
+        <a:font script="Arab" typeface="Arial"/>
+        <a:font script="Hebr" typeface="Arial"/>
+        <a:font script="Thai" typeface="Cordia New"/>
+        <a:font script="Ethi" typeface="Nyala"/>
+        <a:font script="Beng" typeface="Vrinda"/>
+        <a:font script="Gujr" typeface="Shruti"/>
+        <a:font script="Khmr" typeface="DaunPenh"/>
+        <a:font script="Knda" typeface="Tunga"/>
+        <a:font script="Guru" typeface="Raavi"/>
+        <a:font script="Cans" typeface="Euphemia"/>
+        <a:font script="Cher" typeface="Plantagenet Cherokee"/>
+        <a:font script="Yiii" typeface="Microsoft Yi Baiti"/>
+        <a:font script="Tibt" typeface="Microsoft Himalaya"/>
+        <a:font script="Thaa" typeface="MV Boli"/>
+        <a:font script="Deva" typeface="Mangal"/>
+        <a:font script="Telu" typeface="Gautami"/>
+        <a:font script="Taml" typeface="Latha"/>
+        <a:font script="Syrc" typeface="Estrangelo Edessa"/>
+        <a:font script="Orya" typeface="Kalinga"/>
+        <a:font script="Mlym" typeface="Kartika"/>
+        <a:font script="Laoo" typeface="DokChampa"/>
+        <a:font script="Sinh" typeface="Iskoola Pota"/>
+        <a:font script="Mong" typeface="Mongolian Baiti"/>
+        <a:font script="Viet" typeface="Arial"/>
+        <a:font script="Uigh" typeface="Microsoft Uighur"/>
+        <a:font script="Geor" typeface="Sylfaen"/>
+        <a:font script="Armn" typeface="Arial"/>
+        <a:font script="Bugi" typeface="Leelawadee UI"/>
+        <a:font script="Bopo" typeface="Microsoft JhengHei"/>
+        <a:font script="Java" typeface="Javanese Text"/>
+        <a:font script="Lisu" typeface="Segoe UI"/>
+        <a:font script="Mymr" typeface="Myanmar Text"/>
+        <a:font script="Nkoo" typeface="Ebrima"/>
+        <a:font script="Olck" typeface="Nirmala UI"/>
+        <a:font script="Osma" typeface="Ebrima"/>
+        <a:font script="Phag" typeface="Phagspa"/>
+        <a:font script="Syrn" typeface="Estrangelo Edessa"/>
+        <a:font script="Syrj" typeface="Estrangelo Edessa"/>
+        <a:font script="Syre" typeface="Estrangelo Edessa"/>
+        <a:font script="Sora" typeface="Nirmala UI"/>
+        <a:font script="Tale" typeface="Microsoft Tai Le"/>
+        <a:font script="Talu" typeface="Microsoft New Tai Lue"/>
+        <a:font script="Tfng" typeface="Ebrima"/>
+      </a:minorFont>
+    </a:fontScheme>
+    <a:fmtScheme name="Office">
+      <a:fillStyleLst>
+        <a:solidFill>
+          <a:schemeClr val="phClr"/>
+        </a:solidFill>
+        <a:gradFill rotWithShape="1">
+          <a:gsLst>
+            <a:gs pos="0">
+              <a:schemeClr val="phClr">
+                <a:lumMod val="110000"/>
+                <a:satMod val="105000"/>
+                <a:tint val="67000"/>
+              </a:schemeClr>
+            </a:gs>
+            <a:gs pos="50000">
+              <a:schemeClr val="phClr">
+                <a:lumMod val="105000"/>
+                <a:satMod val="103000"/>
+                <a:tint val="73000"/>
+              </a:schemeClr>
+            </a:gs>
+            <a:gs pos="100000">
+              <a:schemeClr val="phClr">
+                <a:lumMod val="105000"/>
+                <a:satMod val="109000"/>
+                <a:tint val="81000"/>
+              </a:schemeClr>
+            </a:gs>
+          </a:gsLst>
+          <a:lin ang="5400000" scaled="0"/>
+        </a:gradFill>
+        <a:gradFill rotWithShape="1">
+          <a:gsLst>
+            <a:gs pos="0">
+              <a:schemeClr val="phClr">
+                <a:satMod val="103000"/>
+                <a:lumMod val="102000"/>
+                <a:tint val="94000"/>
+              </a:schemeClr>
+            </a:gs>
+            <a:gs pos="50000">
+              <a:schemeClr val="phClr">
+                <a:satMod val="110000"/>
+                <a:lumMod val="100000"/>
+                <a:shade val="100000"/>
+              </a:schemeClr>
+            </a:gs>
+            <a:gs pos="100000">
+              <a:schemeClr val="phClr">
+                <a:lumMod val="99000"/>
+                <a:satMod val="120000"/>
+                <a:shade val="78000"/>
+              </a:schemeClr>
+            </a:gs>
+          </a:gsLst>
+          <a:lin ang="5400000" scaled="0"/>
+        </a:gradFill>
+      </a:fillStyleLst>
+      <a:lnStyleLst>
+        <a:ln w="6350" cap="flat" cmpd="sng" algn="ctr">
+          <a:solidFill>
+            <a:schemeClr val="phClr"/>
+          </a:solidFill>
+          <a:prstDash val="solid"/>
+          <a:miter lim="800000"/>
+        </a:ln>
+        <a:ln w="12700" cap="flat" cmpd="sng" algn="ctr">
+          <a:solidFill>
+            <a:schemeClr val="phClr"/>
+          </a:solidFill>
+          <a:prstDash val="solid"/>
+          <a:miter lim="800000"/>
+        </a:ln>
+        <a:ln w="19050" cap="flat" cmpd="sng" algn="ctr">
+          <a:solidFill>
+            <a:schemeClr val="phClr"/>
+          </a:solidFill>
+          <a:prstDash val="solid"/>
+          <a:miter lim="800000"/>
+        </a:ln>
+      </a:lnStyleLst>
+      <a:effectStyleLst>
+        <a:effectStyle>
+          <a:effectLst/>
+        </a:effectStyle>
+        <a:effectStyle>
+          <a:effectLst/>
+        </a:effectStyle>
+        <a:effectStyle>
+          <a:effectLst>
+            <a:outerShdw blurRad="57150" dist="19050" dir="5400000" algn="ctr" rotWithShape="0">
+              <a:srgbClr val="000000">
+                <a:alpha val="63000"/>
+              </a:srgbClr>
+            </a:outerShdw>
+          </a:effectLst>
+        </a:effectStyle>
+      </a:effectStyleLst>
+      <a:bgFillStyleLst>
+        <a:solidFill>
+          <a:schemeClr val="phClr"/>
+        </a:solidFill>
+        <a:solidFill>
+          <a:schemeClr val="phClr">
+            <a:tint val="95000"/>
+            <a:satMod val="170000"/>
+          </a:schemeClr>
+        </a:solidFill>
+        <a:gradFill rotWithShape="1">
+          <a:gsLst>
+            <a:gs pos="0">
+              <a:schemeClr val="phClr">
+                <a:tint val="93000"/>
+                <a:satMod val="150000"/>
+                <a:shade val="98000"/>
+                <a:lumMod val="102000"/>
+              </a:schemeClr>
+            </a:gs>
+            <a:gs pos="50000">
+              <a:schemeClr val="phClr">
+                <a:tint val="98000"/>
+                <a:satMod val="130000"/>
+                <a:shade val="90000"/>
+                <a:lumMod val="103000"/>
+              </a:schemeClr>
+            </a:gs>
+            <a:gs pos="100000">
+              <a:schemeClr val="phClr">
+                <a:shade val="63000"/>
+                <a:satMod val="120000"/>
+              </a:schemeClr>
+            </a:gs>
+          </a:gsLst>
+          <a:lin ang="5400000" scaled="0"/>
+        </a:gradFill>
+      </a:bgFillStyleLst>
+    </a:fmtScheme>
+  </a:themeElements>
+  <a:objectDefaults/>
+  <a:extraClrSchemeLst/>
+  <a:extLst>
+    <a:ext uri="{05A4C25C-085E-4340-85A3-A5531E510DB2}">
+      <thm15:themeFamily xmlns:thm15="http://schemas.microsoft.com/office/thememl/2012/main" name="Office Theme" id="{62F939B6-93AF-4DB8-9C6B-D6C7DFDC589F}" vid="{4A3C46E8-61CC-4603-A589-7422A47A8E4A}"/>
+    </a:ext>
+  </a:extLst>
+</a:theme>
 </file>
</xml_diff>